<commit_message>
Feat: sequence diagram and images
</commit_message>
<xml_diff>
--- a/client/src/images/프레젠테이션1.pptx
+++ b/client/src/images/프레젠테이션1.pptx
@@ -104,6 +104,11 @@
       </a:defRPr>
     </a:lvl9pPr>
   </p:defaultTextStyle>
+  <p:extLst>
+    <p:ext uri="{EFAFB233-063F-42B5-8137-9DF3F51BA10A}">
+      <p15:sldGuideLst xmlns:p15="http://schemas.microsoft.com/office/powerpoint/2012/main"/>
+    </p:ext>
+  </p:extLst>
 </p:presentation>
 </file>
 
@@ -254,7 +259,7 @@
           <a:p>
             <a:fld id="{2781C367-4AF7-4945-8865-BA6CB75C805A}" type="datetimeFigureOut">
               <a:rPr lang="ko-KR" altLang="en-US" smtClean="0"/>
-              <a:t>2022-05-16</a:t>
+              <a:t>2022-05-24</a:t>
             </a:fld>
             <a:endParaRPr lang="ko-KR" altLang="en-US"/>
           </a:p>
@@ -452,7 +457,7 @@
           <a:p>
             <a:fld id="{2781C367-4AF7-4945-8865-BA6CB75C805A}" type="datetimeFigureOut">
               <a:rPr lang="ko-KR" altLang="en-US" smtClean="0"/>
-              <a:t>2022-05-16</a:t>
+              <a:t>2022-05-24</a:t>
             </a:fld>
             <a:endParaRPr lang="ko-KR" altLang="en-US"/>
           </a:p>
@@ -660,7 +665,7 @@
           <a:p>
             <a:fld id="{2781C367-4AF7-4945-8865-BA6CB75C805A}" type="datetimeFigureOut">
               <a:rPr lang="ko-KR" altLang="en-US" smtClean="0"/>
-              <a:t>2022-05-16</a:t>
+              <a:t>2022-05-24</a:t>
             </a:fld>
             <a:endParaRPr lang="ko-KR" altLang="en-US"/>
           </a:p>
@@ -858,7 +863,7 @@
           <a:p>
             <a:fld id="{2781C367-4AF7-4945-8865-BA6CB75C805A}" type="datetimeFigureOut">
               <a:rPr lang="ko-KR" altLang="en-US" smtClean="0"/>
-              <a:t>2022-05-16</a:t>
+              <a:t>2022-05-24</a:t>
             </a:fld>
             <a:endParaRPr lang="ko-KR" altLang="en-US"/>
           </a:p>
@@ -1133,7 +1138,7 @@
           <a:p>
             <a:fld id="{2781C367-4AF7-4945-8865-BA6CB75C805A}" type="datetimeFigureOut">
               <a:rPr lang="ko-KR" altLang="en-US" smtClean="0"/>
-              <a:t>2022-05-16</a:t>
+              <a:t>2022-05-24</a:t>
             </a:fld>
             <a:endParaRPr lang="ko-KR" altLang="en-US"/>
           </a:p>
@@ -1398,7 +1403,7 @@
           <a:p>
             <a:fld id="{2781C367-4AF7-4945-8865-BA6CB75C805A}" type="datetimeFigureOut">
               <a:rPr lang="ko-KR" altLang="en-US" smtClean="0"/>
-              <a:t>2022-05-16</a:t>
+              <a:t>2022-05-24</a:t>
             </a:fld>
             <a:endParaRPr lang="ko-KR" altLang="en-US"/>
           </a:p>
@@ -1810,7 +1815,7 @@
           <a:p>
             <a:fld id="{2781C367-4AF7-4945-8865-BA6CB75C805A}" type="datetimeFigureOut">
               <a:rPr lang="ko-KR" altLang="en-US" smtClean="0"/>
-              <a:t>2022-05-16</a:t>
+              <a:t>2022-05-24</a:t>
             </a:fld>
             <a:endParaRPr lang="ko-KR" altLang="en-US"/>
           </a:p>
@@ -1951,7 +1956,7 @@
           <a:p>
             <a:fld id="{2781C367-4AF7-4945-8865-BA6CB75C805A}" type="datetimeFigureOut">
               <a:rPr lang="ko-KR" altLang="en-US" smtClean="0"/>
-              <a:t>2022-05-16</a:t>
+              <a:t>2022-05-24</a:t>
             </a:fld>
             <a:endParaRPr lang="ko-KR" altLang="en-US"/>
           </a:p>
@@ -2064,7 +2069,7 @@
           <a:p>
             <a:fld id="{2781C367-4AF7-4945-8865-BA6CB75C805A}" type="datetimeFigureOut">
               <a:rPr lang="ko-KR" altLang="en-US" smtClean="0"/>
-              <a:t>2022-05-16</a:t>
+              <a:t>2022-05-24</a:t>
             </a:fld>
             <a:endParaRPr lang="ko-KR" altLang="en-US"/>
           </a:p>
@@ -2375,7 +2380,7 @@
           <a:p>
             <a:fld id="{2781C367-4AF7-4945-8865-BA6CB75C805A}" type="datetimeFigureOut">
               <a:rPr lang="ko-KR" altLang="en-US" smtClean="0"/>
-              <a:t>2022-05-16</a:t>
+              <a:t>2022-05-24</a:t>
             </a:fld>
             <a:endParaRPr lang="ko-KR" altLang="en-US"/>
           </a:p>
@@ -2663,7 +2668,7 @@
           <a:p>
             <a:fld id="{2781C367-4AF7-4945-8865-BA6CB75C805A}" type="datetimeFigureOut">
               <a:rPr lang="ko-KR" altLang="en-US" smtClean="0"/>
-              <a:t>2022-05-16</a:t>
+              <a:t>2022-05-24</a:t>
             </a:fld>
             <a:endParaRPr lang="ko-KR" altLang="en-US"/>
           </a:p>
@@ -2904,7 +2909,7 @@
           <a:p>
             <a:fld id="{2781C367-4AF7-4945-8865-BA6CB75C805A}" type="datetimeFigureOut">
               <a:rPr lang="ko-KR" altLang="en-US" smtClean="0"/>
-              <a:t>2022-05-16</a:t>
+              <a:t>2022-05-24</a:t>
             </a:fld>
             <a:endParaRPr lang="ko-KR" altLang="en-US"/>
           </a:p>
@@ -3619,14 +3624,14 @@
         </p:nvSpPr>
         <p:spPr>
           <a:xfrm rot="5400000">
-            <a:off x="7231146" y="3195458"/>
+            <a:off x="155058" y="767711"/>
             <a:ext cx="2237009" cy="3539187"/>
           </a:xfrm>
           <a:prstGeom prst="triangle">
             <a:avLst/>
           </a:prstGeom>
           <a:solidFill>
-            <a:srgbClr val="E4E9F7"/>
+            <a:schemeClr val="tx1"/>
           </a:solidFill>
           <a:ln w="254000">
             <a:solidFill>
@@ -3957,7 +3962,42 @@
       </a:bgFillStyleLst>
     </a:fmtScheme>
   </a:themeElements>
-  <a:objectDefaults/>
+  <a:objectDefaults>
+    <a:spDef>
+      <a:spPr>
+        <a:solidFill>
+          <a:schemeClr val="tx1"/>
+        </a:solidFill>
+        <a:ln w="254000">
+          <a:solidFill>
+            <a:schemeClr val="tx1"/>
+          </a:solidFill>
+        </a:ln>
+      </a:spPr>
+      <a:bodyPr rtlCol="0" anchor="ctr"/>
+      <a:lstStyle>
+        <a:defPPr algn="ctr">
+          <a:defRPr/>
+        </a:defPPr>
+      </a:lstStyle>
+      <a:style>
+        <a:lnRef idx="2">
+          <a:schemeClr val="accent1">
+            <a:shade val="50000"/>
+          </a:schemeClr>
+        </a:lnRef>
+        <a:fillRef idx="1">
+          <a:schemeClr val="accent1"/>
+        </a:fillRef>
+        <a:effectRef idx="0">
+          <a:schemeClr val="accent1"/>
+        </a:effectRef>
+        <a:fontRef idx="minor">
+          <a:schemeClr val="lt1"/>
+        </a:fontRef>
+      </a:style>
+    </a:spDef>
+  </a:objectDefaults>
   <a:extraClrSchemeLst/>
   <a:extLst>
     <a:ext uri="{05A4C25C-085E-4340-85A3-A5531E510DB2}">

</xml_diff>